<commit_message>
Updates to Oct 4 slides
</commit_message>
<xml_diff>
--- a/Slides/100421.pptx
+++ b/Slides/100421.pptx
@@ -737,10 +737,10 @@
           </a:ln>
           <a:extLst>
             <a:ext uri="{FAA26D3D-D897-4be2-8F04-BA451C77F1D7}">
-              <ma14:placeholderFlag xmlns:ma14="http://schemas.microsoft.com/office/mac/drawingml/2011/main" xmlns="" val="1"/>
+              <ma14:placeholderFlag xmlns="" xmlns:ma14="http://schemas.microsoft.com/office/mac/drawingml/2011/main" val="1"/>
             </a:ext>
             <a:ext uri="{909E8E84-426E-40dd-AFC4-6F175D3DCCD1}">
-              <a14:hiddenFill xmlns:a14="http://schemas.microsoft.com/office/drawing/2010/main" xmlns="">
+              <a14:hiddenFill xmlns="" xmlns:a14="http://schemas.microsoft.com/office/drawing/2010/main">
                 <a:solidFill>
                   <a:srgbClr val="FFFFFF"/>
                 </a:solidFill>
@@ -915,14 +915,14 @@
           <a:ln/>
           <a:extLst>
             <a:ext uri="{909E8E84-426E-40dd-AFC4-6F175D3DCCD1}">
-              <a14:hiddenFill xmlns:a14="http://schemas.microsoft.com/office/drawing/2010/main" xmlns="">
+              <a14:hiddenFill xmlns="" xmlns:a14="http://schemas.microsoft.com/office/drawing/2010/main">
                 <a:solidFill>
                   <a:srgbClr val="FFFFFF"/>
                 </a:solidFill>
               </a14:hiddenFill>
             </a:ext>
             <a:ext uri="{91240B29-F687-4f45-9708-019B960494DF}">
-              <a14:hiddenLine xmlns:a14="http://schemas.microsoft.com/office/drawing/2010/main" xmlns="" w="9525">
+              <a14:hiddenLine xmlns="" xmlns:a14="http://schemas.microsoft.com/office/drawing/2010/main" w="9525">
                 <a:solidFill>
                   <a:srgbClr val="000000"/>
                 </a:solidFill>
@@ -1090,17 +1090,17 @@
           <a:ln/>
           <a:extLst>
             <a:ext uri="{FAA26D3D-D897-4be2-8F04-BA451C77F1D7}">
-              <ma14:placeholderFlag xmlns:ma14="http://schemas.microsoft.com/office/mac/drawingml/2011/main" xmlns="" val="1"/>
+              <ma14:placeholderFlag xmlns="" xmlns:ma14="http://schemas.microsoft.com/office/mac/drawingml/2011/main" val="1"/>
             </a:ext>
             <a:ext uri="{909E8E84-426E-40dd-AFC4-6F175D3DCCD1}">
-              <a14:hiddenFill xmlns:a14="http://schemas.microsoft.com/office/drawing/2010/main" xmlns="">
+              <a14:hiddenFill xmlns="" xmlns:a14="http://schemas.microsoft.com/office/drawing/2010/main">
                 <a:solidFill>
                   <a:srgbClr val="FFFFFF"/>
                 </a:solidFill>
               </a14:hiddenFill>
             </a:ext>
             <a:ext uri="{91240B29-F687-4f45-9708-019B960494DF}">
-              <a14:hiddenLine xmlns:a14="http://schemas.microsoft.com/office/drawing/2010/main" xmlns="" w="9525">
+              <a14:hiddenLine xmlns="" xmlns:a14="http://schemas.microsoft.com/office/drawing/2010/main" w="9525">
                 <a:solidFill>
                   <a:srgbClr val="000000"/>
                 </a:solidFill>
@@ -1517,14 +1517,14 @@
           <a:ln/>
           <a:extLst>
             <a:ext uri="{909E8E84-426E-40dd-AFC4-6F175D3DCCD1}">
-              <a14:hiddenFill xmlns:a14="http://schemas.microsoft.com/office/drawing/2010/main" xmlns="">
+              <a14:hiddenFill xmlns="" xmlns:a14="http://schemas.microsoft.com/office/drawing/2010/main">
                 <a:solidFill>
                   <a:srgbClr val="FFFFFF"/>
                 </a:solidFill>
               </a14:hiddenFill>
             </a:ext>
             <a:ext uri="{91240B29-F687-4f45-9708-019B960494DF}">
-              <a14:hiddenLine xmlns:a14="http://schemas.microsoft.com/office/drawing/2010/main" xmlns="" w="9525">
+              <a14:hiddenLine xmlns="" xmlns:a14="http://schemas.microsoft.com/office/drawing/2010/main" w="9525">
                 <a:solidFill>
                   <a:srgbClr val="000000"/>
                 </a:solidFill>
@@ -1702,7 +1702,7 @@
           </a:ln>
           <a:extLst>
             <a:ext uri="{FAA26D3D-D897-4be2-8F04-BA451C77F1D7}">
-              <ma14:placeholderFlag xmlns:ma14="http://schemas.microsoft.com/office/mac/drawingml/2011/main" xmlns="" val="1"/>
+              <ma14:placeholderFlag xmlns="" xmlns:ma14="http://schemas.microsoft.com/office/mac/drawingml/2011/main" val="1"/>
             </a:ext>
           </a:extLst>
         </p:spPr>
@@ -4893,17 +4893,17 @@
           </a:ln>
           <a:extLst>
             <a:ext uri="{FAA26D3D-D897-4be2-8F04-BA451C77F1D7}">
-              <ma14:placeholderFlag xmlns:ma14="http://schemas.microsoft.com/office/mac/drawingml/2011/main" xmlns="" val="1"/>
+              <ma14:placeholderFlag xmlns="" xmlns:ma14="http://schemas.microsoft.com/office/mac/drawingml/2011/main" val="1"/>
             </a:ext>
             <a:ext uri="{909E8E84-426E-40dd-AFC4-6F175D3DCCD1}">
-              <a14:hiddenFill xmlns:a14="http://schemas.microsoft.com/office/drawing/2010/main" xmlns="">
+              <a14:hiddenFill xmlns="" xmlns:a14="http://schemas.microsoft.com/office/drawing/2010/main">
                 <a:solidFill>
                   <a:srgbClr val="FFFFFF"/>
                 </a:solidFill>
               </a14:hiddenFill>
             </a:ext>
             <a:ext uri="{91240B29-F687-4f45-9708-019B960494DF}">
-              <a14:hiddenLine xmlns:a14="http://schemas.microsoft.com/office/drawing/2010/main" xmlns="" w="9525">
+              <a14:hiddenLine xmlns="" xmlns:a14="http://schemas.microsoft.com/office/drawing/2010/main" w="9525">
                 <a:solidFill>
                   <a:srgbClr val="000000"/>
                 </a:solidFill>
@@ -19427,7 +19427,7 @@
           </a:ln>
           <a:extLst>
             <a:ext uri="{909E8E84-426E-40dd-AFC4-6F175D3DCCD1}">
-              <a14:hiddenFill xmlns:a14="http://schemas.microsoft.com/office/drawing/2010/main" xmlns="">
+              <a14:hiddenFill xmlns="" xmlns:a14="http://schemas.microsoft.com/office/drawing/2010/main">
                 <a:solidFill>
                   <a:srgbClr val="FFFFFF"/>
                 </a:solidFill>
@@ -19470,7 +19470,7 @@
           </a:ln>
           <a:extLst>
             <a:ext uri="{909E8E84-426E-40dd-AFC4-6F175D3DCCD1}">
-              <a14:hiddenFill xmlns:a14="http://schemas.microsoft.com/office/drawing/2010/main" xmlns="">
+              <a14:hiddenFill xmlns="" xmlns:a14="http://schemas.microsoft.com/office/drawing/2010/main">
                 <a:noFill/>
               </a14:hiddenFill>
             </a:ext>
@@ -19506,14 +19506,14 @@
           </a:ln>
           <a:extLst>
             <a:ext uri="{909E8E84-426E-40dd-AFC4-6F175D3DCCD1}">
-              <a14:hiddenFill xmlns:a14="http://schemas.microsoft.com/office/drawing/2010/main" xmlns="">
+              <a14:hiddenFill xmlns="" xmlns:a14="http://schemas.microsoft.com/office/drawing/2010/main">
                 <a:solidFill>
                   <a:srgbClr val="FFFFFF"/>
                 </a:solidFill>
               </a14:hiddenFill>
             </a:ext>
             <a:ext uri="{91240B29-F687-4f45-9708-019B960494DF}">
-              <a14:hiddenLine xmlns:a14="http://schemas.microsoft.com/office/drawing/2010/main" xmlns="" w="9525">
+              <a14:hiddenLine xmlns="" xmlns:a14="http://schemas.microsoft.com/office/drawing/2010/main" w="9525">
                 <a:solidFill>
                   <a:srgbClr val="000000"/>
                 </a:solidFill>
@@ -19739,7 +19739,7 @@
           </a:ln>
           <a:extLst>
             <a:ext uri="{909E8E84-426E-40dd-AFC4-6F175D3DCCD1}">
-              <a14:hiddenFill xmlns:a14="http://schemas.microsoft.com/office/drawing/2010/main" xmlns="">
+              <a14:hiddenFill xmlns="" xmlns:a14="http://schemas.microsoft.com/office/drawing/2010/main">
                 <a:solidFill>
                   <a:srgbClr val="FFFFFF"/>
                 </a:solidFill>
@@ -19777,14 +19777,14 @@
           </a:ln>
           <a:extLst>
             <a:ext uri="{909E8E84-426E-40dd-AFC4-6F175D3DCCD1}">
-              <a14:hiddenFill xmlns:a14="http://schemas.microsoft.com/office/drawing/2010/main" xmlns="">
+              <a14:hiddenFill xmlns="" xmlns:a14="http://schemas.microsoft.com/office/drawing/2010/main">
                 <a:solidFill>
                   <a:srgbClr val="FFFFFF"/>
                 </a:solidFill>
               </a14:hiddenFill>
             </a:ext>
             <a:ext uri="{91240B29-F687-4f45-9708-019B960494DF}">
-              <a14:hiddenLine xmlns:a14="http://schemas.microsoft.com/office/drawing/2010/main" xmlns="" w="9525">
+              <a14:hiddenLine xmlns="" xmlns:a14="http://schemas.microsoft.com/office/drawing/2010/main" w="9525">
                 <a:solidFill>
                   <a:srgbClr val="000000"/>
                 </a:solidFill>
@@ -19940,14 +19940,14 @@
           </a:ln>
           <a:extLst>
             <a:ext uri="{909E8E84-426E-40dd-AFC4-6F175D3DCCD1}">
-              <a14:hiddenFill xmlns:a14="http://schemas.microsoft.com/office/drawing/2010/main" xmlns="">
+              <a14:hiddenFill xmlns="" xmlns:a14="http://schemas.microsoft.com/office/drawing/2010/main">
                 <a:solidFill>
                   <a:srgbClr val="FFFFFF"/>
                 </a:solidFill>
               </a14:hiddenFill>
             </a:ext>
             <a:ext uri="{91240B29-F687-4f45-9708-019B960494DF}">
-              <a14:hiddenLine xmlns:a14="http://schemas.microsoft.com/office/drawing/2010/main" xmlns="" w="9525">
+              <a14:hiddenLine xmlns="" xmlns:a14="http://schemas.microsoft.com/office/drawing/2010/main" w="9525">
                 <a:solidFill>
                   <a:srgbClr val="000000"/>
                 </a:solidFill>
@@ -20149,7 +20149,7 @@
           </a:ln>
           <a:extLst>
             <a:ext uri="{909E8E84-426E-40dd-AFC4-6F175D3DCCD1}">
-              <a14:hiddenFill xmlns:a14="http://schemas.microsoft.com/office/drawing/2010/main" xmlns="">
+              <a14:hiddenFill xmlns="" xmlns:a14="http://schemas.microsoft.com/office/drawing/2010/main">
                 <a:solidFill>
                   <a:srgbClr val="FFFFFF"/>
                 </a:solidFill>
@@ -20233,7 +20233,7 @@
           </a:ln>
           <a:extLst>
             <a:ext uri="{909E8E84-426E-40dd-AFC4-6F175D3DCCD1}">
-              <a14:hiddenFill xmlns:a14="http://schemas.microsoft.com/office/drawing/2010/main" xmlns="">
+              <a14:hiddenFill xmlns="" xmlns:a14="http://schemas.microsoft.com/office/drawing/2010/main">
                 <a:solidFill>
                   <a:srgbClr val="FFFFFF"/>
                 </a:solidFill>
@@ -20317,7 +20317,7 @@
           </a:ln>
           <a:extLst>
             <a:ext uri="{909E8E84-426E-40dd-AFC4-6F175D3DCCD1}">
-              <a14:hiddenFill xmlns:a14="http://schemas.microsoft.com/office/drawing/2010/main" xmlns="">
+              <a14:hiddenFill xmlns="" xmlns:a14="http://schemas.microsoft.com/office/drawing/2010/main">
                 <a:solidFill>
                   <a:srgbClr val="FFFFFF"/>
                 </a:solidFill>
@@ -20360,7 +20360,7 @@
           </a:ln>
           <a:extLst>
             <a:ext uri="{909E8E84-426E-40dd-AFC4-6F175D3DCCD1}">
-              <a14:hiddenFill xmlns:a14="http://schemas.microsoft.com/office/drawing/2010/main" xmlns="">
+              <a14:hiddenFill xmlns="" xmlns:a14="http://schemas.microsoft.com/office/drawing/2010/main">
                 <a:noFill/>
               </a14:hiddenFill>
             </a:ext>
@@ -20401,7 +20401,7 @@
           </a:ln>
           <a:extLst>
             <a:ext uri="{909E8E84-426E-40dd-AFC4-6F175D3DCCD1}">
-              <a14:hiddenFill xmlns:a14="http://schemas.microsoft.com/office/drawing/2010/main" xmlns="">
+              <a14:hiddenFill xmlns="" xmlns:a14="http://schemas.microsoft.com/office/drawing/2010/main">
                 <a:noFill/>
               </a14:hiddenFill>
             </a:ext>
@@ -20442,7 +20442,7 @@
           </a:ln>
           <a:extLst>
             <a:ext uri="{909E8E84-426E-40dd-AFC4-6F175D3DCCD1}">
-              <a14:hiddenFill xmlns:a14="http://schemas.microsoft.com/office/drawing/2010/main" xmlns="">
+              <a14:hiddenFill xmlns="" xmlns:a14="http://schemas.microsoft.com/office/drawing/2010/main">
                 <a:noFill/>
               </a14:hiddenFill>
             </a:ext>
@@ -20485,7 +20485,7 @@
           </a:ln>
           <a:extLst>
             <a:ext uri="{909E8E84-426E-40dd-AFC4-6F175D3DCCD1}">
-              <a14:hiddenFill xmlns:a14="http://schemas.microsoft.com/office/drawing/2010/main" xmlns="">
+              <a14:hiddenFill xmlns="" xmlns:a14="http://schemas.microsoft.com/office/drawing/2010/main">
                 <a:noFill/>
               </a14:hiddenFill>
             </a:ext>
@@ -20520,7 +20520,7 @@
           </a:ln>
           <a:extLst>
             <a:ext uri="{909E8E84-426E-40dd-AFC4-6F175D3DCCD1}">
-              <a14:hiddenFill xmlns:a14="http://schemas.microsoft.com/office/drawing/2010/main" xmlns="">
+              <a14:hiddenFill xmlns="" xmlns:a14="http://schemas.microsoft.com/office/drawing/2010/main">
                 <a:noFill/>
               </a14:hiddenFill>
             </a:ext>
@@ -20556,7 +20556,7 @@
           </a:ln>
           <a:extLst>
             <a:ext uri="{909E8E84-426E-40dd-AFC4-6F175D3DCCD1}">
-              <a14:hiddenFill xmlns:a14="http://schemas.microsoft.com/office/drawing/2010/main" xmlns="">
+              <a14:hiddenFill xmlns="" xmlns:a14="http://schemas.microsoft.com/office/drawing/2010/main">
                 <a:noFill/>
               </a14:hiddenFill>
             </a:ext>
@@ -20591,7 +20591,7 @@
           </a:ln>
           <a:extLst>
             <a:ext uri="{909E8E84-426E-40dd-AFC4-6F175D3DCCD1}">
-              <a14:hiddenFill xmlns:a14="http://schemas.microsoft.com/office/drawing/2010/main" xmlns="">
+              <a14:hiddenFill xmlns="" xmlns:a14="http://schemas.microsoft.com/office/drawing/2010/main">
                 <a:noFill/>
               </a14:hiddenFill>
             </a:ext>
@@ -20641,7 +20641,7 @@
             </a:ln>
             <a:extLst>
               <a:ext uri="{909E8E84-426E-40dd-AFC4-6F175D3DCCD1}">
-                <a14:hiddenFill xmlns:a14="http://schemas.microsoft.com/office/drawing/2010/main" xmlns="">
+                <a14:hiddenFill xmlns="" xmlns:a14="http://schemas.microsoft.com/office/drawing/2010/main">
                   <a:solidFill>
                     <a:srgbClr val="FFFFFF"/>
                   </a:solidFill>
@@ -20686,7 +20686,7 @@
             </a:ln>
             <a:extLst>
               <a:ext uri="{909E8E84-426E-40dd-AFC4-6F175D3DCCD1}">
-                <a14:hiddenFill xmlns:a14="http://schemas.microsoft.com/office/drawing/2010/main" xmlns="">
+                <a14:hiddenFill xmlns="" xmlns:a14="http://schemas.microsoft.com/office/drawing/2010/main">
                   <a:noFill/>
                 </a14:hiddenFill>
               </a:ext>
@@ -20831,7 +20831,7 @@
               </a:ln>
               <a:extLst>
                 <a:ext uri="{909E8E84-426E-40dd-AFC4-6F175D3DCCD1}">
-                  <a14:hiddenFill xmlns:a14="http://schemas.microsoft.com/office/drawing/2010/main" xmlns="">
+                  <a14:hiddenFill xmlns="" xmlns:a14="http://schemas.microsoft.com/office/drawing/2010/main">
                     <a:solidFill>
                       <a:srgbClr val="FFFFFF"/>
                     </a:solidFill>
@@ -20933,7 +20933,7 @@
               </a:ln>
               <a:extLst>
                 <a:ext uri="{909E8E84-426E-40dd-AFC4-6F175D3DCCD1}">
-                  <a14:hiddenFill xmlns:a14="http://schemas.microsoft.com/office/drawing/2010/main" xmlns="">
+                  <a14:hiddenFill xmlns="" xmlns:a14="http://schemas.microsoft.com/office/drawing/2010/main">
                     <a:solidFill>
                       <a:srgbClr val="FFFFFF"/>
                     </a:solidFill>
@@ -21035,7 +21035,7 @@
               </a:ln>
               <a:extLst>
                 <a:ext uri="{909E8E84-426E-40dd-AFC4-6F175D3DCCD1}">
-                  <a14:hiddenFill xmlns:a14="http://schemas.microsoft.com/office/drawing/2010/main" xmlns="">
+                  <a14:hiddenFill xmlns="" xmlns:a14="http://schemas.microsoft.com/office/drawing/2010/main">
                     <a:solidFill>
                       <a:srgbClr val="FFFFFF"/>
                     </a:solidFill>
@@ -21137,7 +21137,7 @@
               </a:ln>
               <a:extLst>
                 <a:ext uri="{909E8E84-426E-40dd-AFC4-6F175D3DCCD1}">
-                  <a14:hiddenFill xmlns:a14="http://schemas.microsoft.com/office/drawing/2010/main" xmlns="">
+                  <a14:hiddenFill xmlns="" xmlns:a14="http://schemas.microsoft.com/office/drawing/2010/main">
                     <a:solidFill>
                       <a:srgbClr val="FFFFFF"/>
                     </a:solidFill>
@@ -21175,14 +21175,14 @@
               </a:ln>
               <a:extLst>
                 <a:ext uri="{909E8E84-426E-40dd-AFC4-6F175D3DCCD1}">
-                  <a14:hiddenFill xmlns:a14="http://schemas.microsoft.com/office/drawing/2010/main" xmlns="">
+                  <a14:hiddenFill xmlns="" xmlns:a14="http://schemas.microsoft.com/office/drawing/2010/main">
                     <a:solidFill>
                       <a:srgbClr val="FFFFFF"/>
                     </a:solidFill>
                   </a14:hiddenFill>
                 </a:ext>
                 <a:ext uri="{91240B29-F687-4f45-9708-019B960494DF}">
-                  <a14:hiddenLine xmlns:a14="http://schemas.microsoft.com/office/drawing/2010/main" xmlns="" w="9525">
+                  <a14:hiddenLine xmlns="" xmlns:a14="http://schemas.microsoft.com/office/drawing/2010/main" w="9525">
                     <a:solidFill>
                       <a:srgbClr val="000000"/>
                     </a:solidFill>
@@ -21336,14 +21336,14 @@
               </a:ln>
               <a:extLst>
                 <a:ext uri="{909E8E84-426E-40dd-AFC4-6F175D3DCCD1}">
-                  <a14:hiddenFill xmlns:a14="http://schemas.microsoft.com/office/drawing/2010/main" xmlns="">
+                  <a14:hiddenFill xmlns="" xmlns:a14="http://schemas.microsoft.com/office/drawing/2010/main">
                     <a:solidFill>
                       <a:srgbClr val="FFFFFF"/>
                     </a:solidFill>
                   </a14:hiddenFill>
                 </a:ext>
                 <a:ext uri="{91240B29-F687-4f45-9708-019B960494DF}">
-                  <a14:hiddenLine xmlns:a14="http://schemas.microsoft.com/office/drawing/2010/main" xmlns="" w="9525">
+                  <a14:hiddenLine xmlns="" xmlns:a14="http://schemas.microsoft.com/office/drawing/2010/main" w="9525">
                     <a:solidFill>
                       <a:srgbClr val="000000"/>
                     </a:solidFill>
@@ -21505,7 +21505,7 @@
               </a:ln>
               <a:extLst>
                 <a:ext uri="{909E8E84-426E-40dd-AFC4-6F175D3DCCD1}">
-                  <a14:hiddenFill xmlns:a14="http://schemas.microsoft.com/office/drawing/2010/main" xmlns="">
+                  <a14:hiddenFill xmlns="" xmlns:a14="http://schemas.microsoft.com/office/drawing/2010/main">
                     <a:noFill/>
                   </a14:hiddenFill>
                 </a:ext>
@@ -21539,7 +21539,7 @@
               </a:ln>
               <a:extLst>
                 <a:ext uri="{909E8E84-426E-40dd-AFC4-6F175D3DCCD1}">
-                  <a14:hiddenFill xmlns:a14="http://schemas.microsoft.com/office/drawing/2010/main" xmlns="">
+                  <a14:hiddenFill xmlns="" xmlns:a14="http://schemas.microsoft.com/office/drawing/2010/main">
                     <a:noFill/>
                   </a14:hiddenFill>
                 </a:ext>
@@ -21564,7 +21564,7 @@
           <a:graphicData uri="http://schemas.openxmlformats.org/presentationml/2006/ole">
             <mc:AlternateContent xmlns:mc="http://schemas.openxmlformats.org/markup-compatibility/2006">
               <mc:Choice xmlns:v="urn:schemas-microsoft-com:vml" Requires="v">
-                <p:oleObj spid="_x0000_s1202" name="Equation" r:id="rId3" imgW="317362" imgH="228501" progId="Equation.3">
+                <p:oleObj spid="_x0000_s1206" name="Equation" r:id="rId3" imgW="317362" imgH="228501" progId="Equation.3">
                   <p:embed/>
                 </p:oleObj>
               </mc:Choice>
@@ -21607,14 +21607,14 @@
                       <a:effectLst/>
                       <a:extLst>
                         <a:ext uri="{909E8E84-426E-40dd-AFC4-6F175D3DCCD1}">
-                          <a14:hiddenFill xmlns:a14="http://schemas.microsoft.com/office/drawing/2010/main" xmlns="">
+                          <a14:hiddenFill xmlns="" xmlns:a14="http://schemas.microsoft.com/office/drawing/2010/main">
                             <a:solidFill>
                               <a:srgbClr val="FFFFFF"/>
                             </a:solidFill>
                           </a14:hiddenFill>
                         </a:ext>
                         <a:ext uri="{91240B29-F687-4f45-9708-019B960494DF}">
-                          <a14:hiddenLine xmlns:a14="http://schemas.microsoft.com/office/drawing/2010/main" xmlns="" w="9525">
+                          <a14:hiddenLine xmlns="" xmlns:a14="http://schemas.microsoft.com/office/drawing/2010/main" w="9525">
                             <a:solidFill>
                               <a:srgbClr val="000000"/>
                             </a:solidFill>
@@ -21624,7 +21624,7 @@
                           </a14:hiddenLine>
                         </a:ext>
                         <a:ext uri="{AF507438-7753-43e0-B8FC-AC1667EBCBE1}">
-                          <a14:hiddenEffects xmlns:a14="http://schemas.microsoft.com/office/drawing/2010/main" xmlns="">
+                          <a14:hiddenEffects xmlns="" xmlns:a14="http://schemas.microsoft.com/office/drawing/2010/main">
                             <a:effectLst>
                               <a:outerShdw blurRad="63500" dist="38099" dir="2700000" algn="ctr" rotWithShape="0">
                                 <a:srgbClr val="000000">
@@ -21659,7 +21659,7 @@
           <a:graphicData uri="http://schemas.openxmlformats.org/presentationml/2006/ole">
             <mc:AlternateContent xmlns:mc="http://schemas.openxmlformats.org/markup-compatibility/2006">
               <mc:Choice xmlns:v="urn:schemas-microsoft-com:vml" Requires="v">
-                <p:oleObj spid="_x0000_s1203" name="Equation" r:id="rId5" imgW="355292" imgH="393359" progId="Equation.3">
+                <p:oleObj spid="_x0000_s1207" name="Equation" r:id="rId5" imgW="355292" imgH="393359" progId="Equation.3">
                   <p:embed/>
                 </p:oleObj>
               </mc:Choice>
@@ -21702,14 +21702,14 @@
                       <a:effectLst/>
                       <a:extLst>
                         <a:ext uri="{909E8E84-426E-40dd-AFC4-6F175D3DCCD1}">
-                          <a14:hiddenFill xmlns:a14="http://schemas.microsoft.com/office/drawing/2010/main" xmlns="">
+                          <a14:hiddenFill xmlns="" xmlns:a14="http://schemas.microsoft.com/office/drawing/2010/main">
                             <a:solidFill>
                               <a:srgbClr val="FFFFFF"/>
                             </a:solidFill>
                           </a14:hiddenFill>
                         </a:ext>
                         <a:ext uri="{91240B29-F687-4f45-9708-019B960494DF}">
-                          <a14:hiddenLine xmlns:a14="http://schemas.microsoft.com/office/drawing/2010/main" xmlns="" w="9525">
+                          <a14:hiddenLine xmlns="" xmlns:a14="http://schemas.microsoft.com/office/drawing/2010/main" w="9525">
                             <a:solidFill>
                               <a:srgbClr val="000000"/>
                             </a:solidFill>
@@ -21719,7 +21719,7 @@
                           </a14:hiddenLine>
                         </a:ext>
                         <a:ext uri="{AF507438-7753-43e0-B8FC-AC1667EBCBE1}">
-                          <a14:hiddenEffects xmlns:a14="http://schemas.microsoft.com/office/drawing/2010/main" xmlns="">
+                          <a14:hiddenEffects xmlns="" xmlns:a14="http://schemas.microsoft.com/office/drawing/2010/main">
                             <a:effectLst>
                               <a:outerShdw blurRad="63500" dist="38099" dir="2700000" algn="ctr" rotWithShape="0">
                                 <a:srgbClr val="000000">
@@ -22468,7 +22468,7 @@
           <a:graphicData uri="http://schemas.openxmlformats.org/presentationml/2006/ole">
             <mc:AlternateContent xmlns:mc="http://schemas.openxmlformats.org/markup-compatibility/2006">
               <mc:Choice xmlns:v="urn:schemas-microsoft-com:vml" Requires="v">
-                <p:oleObj spid="_x0000_s2314" name="Equation" r:id="rId3" imgW="2717800" imgH="1511300" progId="Equation.3">
+                <p:oleObj spid="_x0000_s2320" name="Equation" r:id="rId3" imgW="2717800" imgH="1511300" progId="Equation.3">
                   <p:embed/>
                 </p:oleObj>
               </mc:Choice>
@@ -22702,7 +22702,7 @@
           </a:ln>
           <a:extLst>
             <a:ext uri="{909E8E84-426E-40dd-AFC4-6F175D3DCCD1}">
-              <a14:hiddenFill xmlns:a14="http://schemas.microsoft.com/office/drawing/2010/main" xmlns="">
+              <a14:hiddenFill xmlns="" xmlns:a14="http://schemas.microsoft.com/office/drawing/2010/main">
                 <a:solidFill>
                   <a:srgbClr val="FFFFFF"/>
                 </a:solidFill>
@@ -22745,7 +22745,7 @@
           </a:ln>
           <a:extLst>
             <a:ext uri="{909E8E84-426E-40dd-AFC4-6F175D3DCCD1}">
-              <a14:hiddenFill xmlns:a14="http://schemas.microsoft.com/office/drawing/2010/main" xmlns="">
+              <a14:hiddenFill xmlns="" xmlns:a14="http://schemas.microsoft.com/office/drawing/2010/main">
                 <a:noFill/>
               </a14:hiddenFill>
             </a:ext>
@@ -22781,14 +22781,14 @@
           </a:ln>
           <a:extLst>
             <a:ext uri="{909E8E84-426E-40dd-AFC4-6F175D3DCCD1}">
-              <a14:hiddenFill xmlns:a14="http://schemas.microsoft.com/office/drawing/2010/main" xmlns="">
+              <a14:hiddenFill xmlns="" xmlns:a14="http://schemas.microsoft.com/office/drawing/2010/main">
                 <a:solidFill>
                   <a:srgbClr val="FFFFFF"/>
                 </a:solidFill>
               </a14:hiddenFill>
             </a:ext>
             <a:ext uri="{91240B29-F687-4f45-9708-019B960494DF}">
-              <a14:hiddenLine xmlns:a14="http://schemas.microsoft.com/office/drawing/2010/main" xmlns="" w="9525">
+              <a14:hiddenLine xmlns="" xmlns:a14="http://schemas.microsoft.com/office/drawing/2010/main" w="9525">
                 <a:solidFill>
                   <a:srgbClr val="000000"/>
                 </a:solidFill>
@@ -23014,7 +23014,7 @@
           </a:ln>
           <a:extLst>
             <a:ext uri="{909E8E84-426E-40dd-AFC4-6F175D3DCCD1}">
-              <a14:hiddenFill xmlns:a14="http://schemas.microsoft.com/office/drawing/2010/main" xmlns="">
+              <a14:hiddenFill xmlns="" xmlns:a14="http://schemas.microsoft.com/office/drawing/2010/main">
                 <a:solidFill>
                   <a:srgbClr val="FFFFFF"/>
                 </a:solidFill>
@@ -23052,14 +23052,14 @@
           </a:ln>
           <a:extLst>
             <a:ext uri="{909E8E84-426E-40dd-AFC4-6F175D3DCCD1}">
-              <a14:hiddenFill xmlns:a14="http://schemas.microsoft.com/office/drawing/2010/main" xmlns="">
+              <a14:hiddenFill xmlns="" xmlns:a14="http://schemas.microsoft.com/office/drawing/2010/main">
                 <a:solidFill>
                   <a:srgbClr val="FFFFFF"/>
                 </a:solidFill>
               </a14:hiddenFill>
             </a:ext>
             <a:ext uri="{91240B29-F687-4f45-9708-019B960494DF}">
-              <a14:hiddenLine xmlns:a14="http://schemas.microsoft.com/office/drawing/2010/main" xmlns="" w="9525">
+              <a14:hiddenLine xmlns="" xmlns:a14="http://schemas.microsoft.com/office/drawing/2010/main" w="9525">
                 <a:solidFill>
                   <a:srgbClr val="000000"/>
                 </a:solidFill>
@@ -23215,14 +23215,14 @@
           </a:ln>
           <a:extLst>
             <a:ext uri="{909E8E84-426E-40dd-AFC4-6F175D3DCCD1}">
-              <a14:hiddenFill xmlns:a14="http://schemas.microsoft.com/office/drawing/2010/main" xmlns="">
+              <a14:hiddenFill xmlns="" xmlns:a14="http://schemas.microsoft.com/office/drawing/2010/main">
                 <a:solidFill>
                   <a:srgbClr val="FFFFFF"/>
                 </a:solidFill>
               </a14:hiddenFill>
             </a:ext>
             <a:ext uri="{91240B29-F687-4f45-9708-019B960494DF}">
-              <a14:hiddenLine xmlns:a14="http://schemas.microsoft.com/office/drawing/2010/main" xmlns="" w="9525">
+              <a14:hiddenLine xmlns="" xmlns:a14="http://schemas.microsoft.com/office/drawing/2010/main" w="9525">
                 <a:solidFill>
                   <a:srgbClr val="000000"/>
                 </a:solidFill>
@@ -23427,7 +23427,7 @@
           </a:ln>
           <a:extLst>
             <a:ext uri="{909E8E84-426E-40dd-AFC4-6F175D3DCCD1}">
-              <a14:hiddenFill xmlns:a14="http://schemas.microsoft.com/office/drawing/2010/main" xmlns="">
+              <a14:hiddenFill xmlns="" xmlns:a14="http://schemas.microsoft.com/office/drawing/2010/main">
                 <a:solidFill>
                   <a:srgbClr val="FFFFFF"/>
                 </a:solidFill>
@@ -23511,7 +23511,7 @@
           </a:ln>
           <a:extLst>
             <a:ext uri="{909E8E84-426E-40dd-AFC4-6F175D3DCCD1}">
-              <a14:hiddenFill xmlns:a14="http://schemas.microsoft.com/office/drawing/2010/main" xmlns="">
+              <a14:hiddenFill xmlns="" xmlns:a14="http://schemas.microsoft.com/office/drawing/2010/main">
                 <a:solidFill>
                   <a:srgbClr val="FFFFFF"/>
                 </a:solidFill>
@@ -23595,7 +23595,7 @@
           </a:ln>
           <a:extLst>
             <a:ext uri="{909E8E84-426E-40dd-AFC4-6F175D3DCCD1}">
-              <a14:hiddenFill xmlns:a14="http://schemas.microsoft.com/office/drawing/2010/main" xmlns="">
+              <a14:hiddenFill xmlns="" xmlns:a14="http://schemas.microsoft.com/office/drawing/2010/main">
                 <a:solidFill>
                   <a:srgbClr val="FFFFFF"/>
                 </a:solidFill>
@@ -23638,7 +23638,7 @@
           </a:ln>
           <a:extLst>
             <a:ext uri="{909E8E84-426E-40dd-AFC4-6F175D3DCCD1}">
-              <a14:hiddenFill xmlns:a14="http://schemas.microsoft.com/office/drawing/2010/main" xmlns="">
+              <a14:hiddenFill xmlns="" xmlns:a14="http://schemas.microsoft.com/office/drawing/2010/main">
                 <a:noFill/>
               </a14:hiddenFill>
             </a:ext>
@@ -23679,7 +23679,7 @@
           </a:ln>
           <a:extLst>
             <a:ext uri="{909E8E84-426E-40dd-AFC4-6F175D3DCCD1}">
-              <a14:hiddenFill xmlns:a14="http://schemas.microsoft.com/office/drawing/2010/main" xmlns="">
+              <a14:hiddenFill xmlns="" xmlns:a14="http://schemas.microsoft.com/office/drawing/2010/main">
                 <a:noFill/>
               </a14:hiddenFill>
             </a:ext>
@@ -23720,7 +23720,7 @@
           </a:ln>
           <a:extLst>
             <a:ext uri="{909E8E84-426E-40dd-AFC4-6F175D3DCCD1}">
-              <a14:hiddenFill xmlns:a14="http://schemas.microsoft.com/office/drawing/2010/main" xmlns="">
+              <a14:hiddenFill xmlns="" xmlns:a14="http://schemas.microsoft.com/office/drawing/2010/main">
                 <a:noFill/>
               </a14:hiddenFill>
             </a:ext>
@@ -23763,7 +23763,7 @@
           </a:ln>
           <a:extLst>
             <a:ext uri="{909E8E84-426E-40dd-AFC4-6F175D3DCCD1}">
-              <a14:hiddenFill xmlns:a14="http://schemas.microsoft.com/office/drawing/2010/main" xmlns="">
+              <a14:hiddenFill xmlns="" xmlns:a14="http://schemas.microsoft.com/office/drawing/2010/main">
                 <a:noFill/>
               </a14:hiddenFill>
             </a:ext>
@@ -23798,7 +23798,7 @@
           </a:ln>
           <a:extLst>
             <a:ext uri="{909E8E84-426E-40dd-AFC4-6F175D3DCCD1}">
-              <a14:hiddenFill xmlns:a14="http://schemas.microsoft.com/office/drawing/2010/main" xmlns="">
+              <a14:hiddenFill xmlns="" xmlns:a14="http://schemas.microsoft.com/office/drawing/2010/main">
                 <a:noFill/>
               </a14:hiddenFill>
             </a:ext>
@@ -23834,7 +23834,7 @@
           </a:ln>
           <a:extLst>
             <a:ext uri="{909E8E84-426E-40dd-AFC4-6F175D3DCCD1}">
-              <a14:hiddenFill xmlns:a14="http://schemas.microsoft.com/office/drawing/2010/main" xmlns="">
+              <a14:hiddenFill xmlns="" xmlns:a14="http://schemas.microsoft.com/office/drawing/2010/main">
                 <a:noFill/>
               </a14:hiddenFill>
             </a:ext>
@@ -23869,7 +23869,7 @@
           </a:ln>
           <a:extLst>
             <a:ext uri="{909E8E84-426E-40dd-AFC4-6F175D3DCCD1}">
-              <a14:hiddenFill xmlns:a14="http://schemas.microsoft.com/office/drawing/2010/main" xmlns="">
+              <a14:hiddenFill xmlns="" xmlns:a14="http://schemas.microsoft.com/office/drawing/2010/main">
                 <a:noFill/>
               </a14:hiddenFill>
             </a:ext>
@@ -23892,7 +23892,7 @@
           <a:graphicData uri="http://schemas.openxmlformats.org/presentationml/2006/ole">
             <mc:AlternateContent xmlns:mc="http://schemas.openxmlformats.org/markup-compatibility/2006">
               <mc:Choice xmlns:v="urn:schemas-microsoft-com:vml" Requires="v">
-                <p:oleObj spid="_x0000_s2315" name="Equation" r:id="rId5" imgW="317362" imgH="228501" progId="Equation.3">
+                <p:oleObj spid="_x0000_s2321" name="Equation" r:id="rId5" imgW="317362" imgH="228501" progId="Equation.3">
                   <p:embed/>
                 </p:oleObj>
               </mc:Choice>
@@ -23935,14 +23935,14 @@
                       <a:effectLst/>
                       <a:extLst>
                         <a:ext uri="{909E8E84-426E-40dd-AFC4-6F175D3DCCD1}">
-                          <a14:hiddenFill xmlns:a14="http://schemas.microsoft.com/office/drawing/2010/main" xmlns="">
+                          <a14:hiddenFill xmlns="" xmlns:a14="http://schemas.microsoft.com/office/drawing/2010/main">
                             <a:solidFill>
                               <a:srgbClr val="FFFFFF"/>
                             </a:solidFill>
                           </a14:hiddenFill>
                         </a:ext>
                         <a:ext uri="{91240B29-F687-4f45-9708-019B960494DF}">
-                          <a14:hiddenLine xmlns:a14="http://schemas.microsoft.com/office/drawing/2010/main" xmlns="" w="9525">
+                          <a14:hiddenLine xmlns="" xmlns:a14="http://schemas.microsoft.com/office/drawing/2010/main" w="9525">
                             <a:solidFill>
                               <a:srgbClr val="000000"/>
                             </a:solidFill>
@@ -23952,7 +23952,7 @@
                           </a14:hiddenLine>
                         </a:ext>
                         <a:ext uri="{AF507438-7753-43e0-B8FC-AC1667EBCBE1}">
-                          <a14:hiddenEffects xmlns:a14="http://schemas.microsoft.com/office/drawing/2010/main" xmlns="">
+                          <a14:hiddenEffects xmlns="" xmlns:a14="http://schemas.microsoft.com/office/drawing/2010/main">
                             <a:effectLst>
                               <a:outerShdw blurRad="63500" dist="38099" dir="2700000" algn="ctr" rotWithShape="0">
                                 <a:srgbClr val="000000">
@@ -23987,7 +23987,7 @@
           <a:graphicData uri="http://schemas.openxmlformats.org/presentationml/2006/ole">
             <mc:AlternateContent xmlns:mc="http://schemas.openxmlformats.org/markup-compatibility/2006">
               <mc:Choice xmlns:v="urn:schemas-microsoft-com:vml" Requires="v">
-                <p:oleObj spid="_x0000_s2316" name="Equation" r:id="rId7" imgW="355292" imgH="393359" progId="Equation.3">
+                <p:oleObj spid="_x0000_s2322" name="Equation" r:id="rId7" imgW="355292" imgH="393359" progId="Equation.3">
                   <p:embed/>
                 </p:oleObj>
               </mc:Choice>
@@ -24030,14 +24030,14 @@
                       <a:effectLst/>
                       <a:extLst>
                         <a:ext uri="{909E8E84-426E-40dd-AFC4-6F175D3DCCD1}">
-                          <a14:hiddenFill xmlns:a14="http://schemas.microsoft.com/office/drawing/2010/main" xmlns="">
+                          <a14:hiddenFill xmlns="" xmlns:a14="http://schemas.microsoft.com/office/drawing/2010/main">
                             <a:solidFill>
                               <a:srgbClr val="FFFFFF"/>
                             </a:solidFill>
                           </a14:hiddenFill>
                         </a:ext>
                         <a:ext uri="{91240B29-F687-4f45-9708-019B960494DF}">
-                          <a14:hiddenLine xmlns:a14="http://schemas.microsoft.com/office/drawing/2010/main" xmlns="" w="9525">
+                          <a14:hiddenLine xmlns="" xmlns:a14="http://schemas.microsoft.com/office/drawing/2010/main" w="9525">
                             <a:solidFill>
                               <a:srgbClr val="000000"/>
                             </a:solidFill>
@@ -24047,7 +24047,7 @@
                           </a14:hiddenLine>
                         </a:ext>
                         <a:ext uri="{AF507438-7753-43e0-B8FC-AC1667EBCBE1}">
-                          <a14:hiddenEffects xmlns:a14="http://schemas.microsoft.com/office/drawing/2010/main" xmlns="">
+                          <a14:hiddenEffects xmlns="" xmlns:a14="http://schemas.microsoft.com/office/drawing/2010/main">
                             <a:effectLst>
                               <a:outerShdw blurRad="63500" dist="38099" dir="2700000" algn="ctr" rotWithShape="0">
                                 <a:srgbClr val="000000">
@@ -24573,37 +24573,6 @@
           </a:p>
         </p:txBody>
       </p:sp>
-      <p:sp>
-        <p:nvSpPr>
-          <p:cNvPr id="6" name="Footer Placeholder 5">
-            <a:extLst>
-              <a:ext uri="{FF2B5EF4-FFF2-40B4-BE49-F238E27FC236}">
-                <a16:creationId xmlns:a16="http://schemas.microsoft.com/office/drawing/2014/main" id="{5344EBB7-6B81-AC42-9118-E9787A236984}"/>
-              </a:ext>
-            </a:extLst>
-          </p:cNvPr>
-          <p:cNvSpPr>
-            <a:spLocks noGrp="1"/>
-          </p:cNvSpPr>
-          <p:nvPr>
-            <p:ph type="ftr" sz="quarter" idx="11"/>
-          </p:nvPr>
-        </p:nvSpPr>
-        <p:spPr/>
-        <p:txBody>
-          <a:bodyPr/>
-          <a:lstStyle/>
-          <a:p>
-            <a:r>
-              <a:rPr lang="en-US"/>
-              <a:t>EECS 489 – Lecture 9</a:t>
-            </a:r>
-            <a:endParaRPr lang="en-US" sz="1050" b="0">
-              <a:latin typeface="Times New Roman" charset="0"/>
-            </a:endParaRPr>
-          </a:p>
-        </p:txBody>
-      </p:sp>
     </p:spTree>
     <p:extLst>
       <p:ext uri="{BB962C8B-B14F-4D97-AF65-F5344CB8AC3E}">
@@ -24903,7 +24872,7 @@
           <a:graphicData uri="http://schemas.openxmlformats.org/presentationml/2006/ole">
             <mc:AlternateContent xmlns:mc="http://schemas.openxmlformats.org/markup-compatibility/2006">
               <mc:Choice xmlns:v="urn:schemas-microsoft-com:vml" Requires="v">
-                <p:oleObj spid="_x0000_s3162" name="Equation" r:id="rId3" imgW="1663700" imgH="469900" progId="Equation.3">
+                <p:oleObj spid="_x0000_s3164" name="Equation" r:id="rId3" imgW="1663700" imgH="469900" progId="Equation.3">
                   <p:embed/>
                 </p:oleObj>
               </mc:Choice>
@@ -24989,12 +24958,12 @@
             <a:effectLst/>
             <a:extLst>
               <a:ext uri="{909E8E84-426E-40dd-AFC4-6F175D3DCCD1}">
-                <a14:hiddenFill xmlns:a14="http://schemas.microsoft.com/office/drawing/2010/main" xmlns="">
+                <a14:hiddenFill xmlns="" xmlns:a14="http://schemas.microsoft.com/office/drawing/2010/main">
                   <a:noFill/>
                 </a14:hiddenFill>
               </a:ext>
               <a:ext uri="{AF507438-7753-43e0-B8FC-AC1667EBCBE1}">
-                <a14:hiddenEffects xmlns:a14="http://schemas.microsoft.com/office/drawing/2010/main" xmlns="">
+                <a14:hiddenEffects xmlns="" xmlns:a14="http://schemas.microsoft.com/office/drawing/2010/main">
                   <a:effectLst>
                     <a:outerShdw blurRad="63500" dist="38099" dir="2700000" algn="ctr" rotWithShape="0">
                       <a:schemeClr val="bg2">
@@ -25037,14 +25006,14 @@
             <a:effectLst/>
             <a:extLst>
               <a:ext uri="{909E8E84-426E-40dd-AFC4-6F175D3DCCD1}">
-                <a14:hiddenFill xmlns:a14="http://schemas.microsoft.com/office/drawing/2010/main" xmlns="">
+                <a14:hiddenFill xmlns="" xmlns:a14="http://schemas.microsoft.com/office/drawing/2010/main">
                   <a:solidFill>
                     <a:schemeClr val="accent1"/>
                   </a:solidFill>
                 </a14:hiddenFill>
               </a:ext>
               <a:ext uri="{91240B29-F687-4f45-9708-019B960494DF}">
-                <a14:hiddenLine xmlns:a14="http://schemas.microsoft.com/office/drawing/2010/main" xmlns="" w="9525">
+                <a14:hiddenLine xmlns="" xmlns:a14="http://schemas.microsoft.com/office/drawing/2010/main" w="9525">
                   <a:solidFill>
                     <a:schemeClr val="tx1"/>
                   </a:solidFill>
@@ -25054,7 +25023,7 @@
                 </a14:hiddenLine>
               </a:ext>
               <a:ext uri="{AF507438-7753-43e0-B8FC-AC1667EBCBE1}">
-                <a14:hiddenEffects xmlns:a14="http://schemas.microsoft.com/office/drawing/2010/main" xmlns="">
+                <a14:hiddenEffects xmlns="" xmlns:a14="http://schemas.microsoft.com/office/drawing/2010/main">
                   <a:effectLst>
                     <a:outerShdw blurRad="63500" dist="38099" dir="2700000" algn="ctr" rotWithShape="0">
                       <a:schemeClr val="bg2">
@@ -25107,7 +25076,7 @@
             <a:effectLst/>
             <a:extLst>
               <a:ext uri="{AF507438-7753-43e0-B8FC-AC1667EBCBE1}">
-                <a14:hiddenEffects xmlns:a14="http://schemas.microsoft.com/office/drawing/2010/main" xmlns="">
+                <a14:hiddenEffects xmlns="" xmlns:a14="http://schemas.microsoft.com/office/drawing/2010/main">
                   <a:effectLst>
                     <a:outerShdw blurRad="63500" dist="38099" dir="2700000" algn="ctr" rotWithShape="0">
                       <a:schemeClr val="bg2">
@@ -25163,7 +25132,7 @@
             <a:effectLst/>
             <a:extLst>
               <a:ext uri="{AF507438-7753-43e0-B8FC-AC1667EBCBE1}">
-                <a14:hiddenEffects xmlns:a14="http://schemas.microsoft.com/office/drawing/2010/main" xmlns="">
+                <a14:hiddenEffects xmlns="" xmlns:a14="http://schemas.microsoft.com/office/drawing/2010/main">
                   <a:effectLst>
                     <a:outerShdw blurRad="63500" dist="38099" dir="2700000" algn="ctr" rotWithShape="0">
                       <a:schemeClr val="bg2">
@@ -25219,7 +25188,7 @@
             <a:effectLst/>
             <a:extLst>
               <a:ext uri="{AF507438-7753-43e0-B8FC-AC1667EBCBE1}">
-                <a14:hiddenEffects xmlns:a14="http://schemas.microsoft.com/office/drawing/2010/main" xmlns="">
+                <a14:hiddenEffects xmlns="" xmlns:a14="http://schemas.microsoft.com/office/drawing/2010/main">
                   <a:effectLst>
                     <a:outerShdw blurRad="63500" dist="38099" dir="2700000" algn="ctr" rotWithShape="0">
                       <a:schemeClr val="bg2">
@@ -25275,7 +25244,7 @@
             <a:effectLst/>
             <a:extLst>
               <a:ext uri="{AF507438-7753-43e0-B8FC-AC1667EBCBE1}">
-                <a14:hiddenEffects xmlns:a14="http://schemas.microsoft.com/office/drawing/2010/main" xmlns="">
+                <a14:hiddenEffects xmlns="" xmlns:a14="http://schemas.microsoft.com/office/drawing/2010/main">
                   <a:effectLst>
                     <a:outerShdw blurRad="63500" dist="38099" dir="2700000" algn="ctr" rotWithShape="0">
                       <a:schemeClr val="bg2">
@@ -25330,12 +25299,12 @@
             <a:effectLst/>
             <a:extLst>
               <a:ext uri="{909E8E84-426E-40dd-AFC4-6F175D3DCCD1}">
-                <a14:hiddenFill xmlns:a14="http://schemas.microsoft.com/office/drawing/2010/main" xmlns="">
+                <a14:hiddenFill xmlns="" xmlns:a14="http://schemas.microsoft.com/office/drawing/2010/main">
                   <a:noFill/>
                 </a14:hiddenFill>
               </a:ext>
               <a:ext uri="{AF507438-7753-43e0-B8FC-AC1667EBCBE1}">
-                <a14:hiddenEffects xmlns:a14="http://schemas.microsoft.com/office/drawing/2010/main" xmlns="">
+                <a14:hiddenEffects xmlns="" xmlns:a14="http://schemas.microsoft.com/office/drawing/2010/main">
                   <a:effectLst>
                     <a:outerShdw blurRad="63500" dist="38099" dir="2700000" algn="ctr" rotWithShape="0">
                       <a:schemeClr val="bg2">
@@ -25392,14 +25361,14 @@
           <a:effectLst/>
           <a:extLst>
             <a:ext uri="{909E8E84-426E-40dd-AFC4-6F175D3DCCD1}">
-              <a14:hiddenFill xmlns:a14="http://schemas.microsoft.com/office/drawing/2010/main" xmlns="">
+              <a14:hiddenFill xmlns="" xmlns:a14="http://schemas.microsoft.com/office/drawing/2010/main">
                 <a:solidFill>
                   <a:schemeClr val="accent1"/>
                 </a:solidFill>
               </a14:hiddenFill>
             </a:ext>
             <a:ext uri="{91240B29-F687-4f45-9708-019B960494DF}">
-              <a14:hiddenLine xmlns:a14="http://schemas.microsoft.com/office/drawing/2010/main" xmlns="" w="9525">
+              <a14:hiddenLine xmlns="" xmlns:a14="http://schemas.microsoft.com/office/drawing/2010/main" w="9525">
                 <a:solidFill>
                   <a:schemeClr val="tx1"/>
                 </a:solidFill>
@@ -25409,7 +25378,7 @@
               </a14:hiddenLine>
             </a:ext>
             <a:ext uri="{AF507438-7753-43e0-B8FC-AC1667EBCBE1}">
-              <a14:hiddenEffects xmlns:a14="http://schemas.microsoft.com/office/drawing/2010/main" xmlns="">
+              <a14:hiddenEffects xmlns="" xmlns:a14="http://schemas.microsoft.com/office/drawing/2010/main">
                 <a:effectLst>
                   <a:outerShdw blurRad="63500" dist="38099" dir="2700000" algn="ctr" rotWithShape="0">
                     <a:schemeClr val="bg2">
@@ -25458,14 +25427,14 @@
           <a:effectLst/>
           <a:extLst>
             <a:ext uri="{909E8E84-426E-40dd-AFC4-6F175D3DCCD1}">
-              <a14:hiddenFill xmlns:a14="http://schemas.microsoft.com/office/drawing/2010/main" xmlns="">
+              <a14:hiddenFill xmlns="" xmlns:a14="http://schemas.microsoft.com/office/drawing/2010/main">
                 <a:solidFill>
                   <a:schemeClr val="accent1"/>
                 </a:solidFill>
               </a14:hiddenFill>
             </a:ext>
             <a:ext uri="{91240B29-F687-4f45-9708-019B960494DF}">
-              <a14:hiddenLine xmlns:a14="http://schemas.microsoft.com/office/drawing/2010/main" xmlns="" w="9525">
+              <a14:hiddenLine xmlns="" xmlns:a14="http://schemas.microsoft.com/office/drawing/2010/main" w="9525">
                 <a:solidFill>
                   <a:schemeClr val="tx1"/>
                 </a:solidFill>
@@ -25475,7 +25444,7 @@
               </a14:hiddenLine>
             </a:ext>
             <a:ext uri="{AF507438-7753-43e0-B8FC-AC1667EBCBE1}">
-              <a14:hiddenEffects xmlns:a14="http://schemas.microsoft.com/office/drawing/2010/main" xmlns="">
+              <a14:hiddenEffects xmlns="" xmlns:a14="http://schemas.microsoft.com/office/drawing/2010/main">
                 <a:effectLst>
                   <a:outerShdw blurRad="63500" dist="38099" dir="2700000" algn="ctr" rotWithShape="0">
                     <a:schemeClr val="bg2">
@@ -26156,7 +26125,7 @@
           <a:graphicData uri="http://schemas.openxmlformats.org/presentationml/2006/ole">
             <mc:AlternateContent xmlns:mc="http://schemas.openxmlformats.org/markup-compatibility/2006">
               <mc:Choice xmlns:v="urn:schemas-microsoft-com:vml" Requires="v">
-                <p:oleObj spid="_x0000_s4186" name="Equation" r:id="rId3" imgW="1663700" imgH="469900" progId="Equation.3">
+                <p:oleObj spid="_x0000_s4188" name="Equation" r:id="rId3" imgW="1663700" imgH="469900" progId="Equation.3">
                   <p:embed/>
                 </p:oleObj>
               </mc:Choice>
@@ -27630,7 +27599,7 @@
           <a:graphicData uri="http://schemas.openxmlformats.org/presentationml/2006/ole">
             <mc:AlternateContent xmlns:mc="http://schemas.openxmlformats.org/markup-compatibility/2006">
               <mc:Choice xmlns:v="urn:schemas-microsoft-com:vml" Requires="v">
-                <p:oleObj spid="_x0000_s5210" name="Equation" r:id="rId3" imgW="1663700" imgH="469900" progId="Equation.3">
+                <p:oleObj spid="_x0000_s5212" name="Equation" r:id="rId3" imgW="1663700" imgH="469900" progId="Equation.3">
                   <p:embed/>
                 </p:oleObj>
               </mc:Choice>
@@ -30075,14 +30044,14 @@
           </a:ln>
           <a:extLst>
             <a:ext uri="{909E8E84-426E-40dd-AFC4-6F175D3DCCD1}">
-              <a14:hiddenFill xmlns:a14="http://schemas.microsoft.com/office/drawing/2010/main" xmlns="">
+              <a14:hiddenFill xmlns="" xmlns:a14="http://schemas.microsoft.com/office/drawing/2010/main">
                 <a:solidFill>
                   <a:srgbClr val="FFFFFF"/>
                 </a:solidFill>
               </a14:hiddenFill>
             </a:ext>
             <a:ext uri="{91240B29-F687-4f45-9708-019B960494DF}">
-              <a14:hiddenLine xmlns:a14="http://schemas.microsoft.com/office/drawing/2010/main" xmlns="" w="9525">
+              <a14:hiddenLine xmlns="" xmlns:a14="http://schemas.microsoft.com/office/drawing/2010/main" w="9525">
                 <a:solidFill>
                   <a:srgbClr val="000000"/>
                 </a:solidFill>
@@ -30147,7 +30116,7 @@
             <a:effectLst/>
             <a:extLst>
               <a:ext uri="{AF507438-7753-43e0-B8FC-AC1667EBCBE1}">
-                <a14:hiddenEffects xmlns:a14="http://schemas.microsoft.com/office/drawing/2010/main" xmlns="">
+                <a14:hiddenEffects xmlns="" xmlns:a14="http://schemas.microsoft.com/office/drawing/2010/main">
                   <a:effectLst>
                     <a:outerShdw blurRad="63500" dist="38099" dir="2700000" algn="ctr" rotWithShape="0">
                       <a:schemeClr val="bg2">
@@ -30206,7 +30175,7 @@
             <a:effectLst/>
             <a:extLst>
               <a:ext uri="{AF507438-7753-43e0-B8FC-AC1667EBCBE1}">
-                <a14:hiddenEffects xmlns:a14="http://schemas.microsoft.com/office/drawing/2010/main" xmlns="">
+                <a14:hiddenEffects xmlns="" xmlns:a14="http://schemas.microsoft.com/office/drawing/2010/main">
                   <a:effectLst>
                     <a:outerShdw blurRad="63500" dist="38099" dir="2700000" algn="ctr" rotWithShape="0">
                       <a:schemeClr val="bg2">
@@ -30261,7 +30230,7 @@
             <a:effectLst/>
             <a:extLst>
               <a:ext uri="{AF507438-7753-43e0-B8FC-AC1667EBCBE1}">
-                <a14:hiddenEffects xmlns:a14="http://schemas.microsoft.com/office/drawing/2010/main" xmlns="">
+                <a14:hiddenEffects xmlns="" xmlns:a14="http://schemas.microsoft.com/office/drawing/2010/main">
                   <a:effectLst>
                     <a:outerShdw blurRad="63500" dist="38099" dir="2700000" algn="ctr" rotWithShape="0">
                       <a:schemeClr val="bg2">
@@ -30318,12 +30287,12 @@
             <a:effectLst/>
             <a:extLst>
               <a:ext uri="{909E8E84-426E-40dd-AFC4-6F175D3DCCD1}">
-                <a14:hiddenFill xmlns:a14="http://schemas.microsoft.com/office/drawing/2010/main" xmlns="">
+                <a14:hiddenFill xmlns="" xmlns:a14="http://schemas.microsoft.com/office/drawing/2010/main">
                   <a:noFill/>
                 </a14:hiddenFill>
               </a:ext>
               <a:ext uri="{AF507438-7753-43e0-B8FC-AC1667EBCBE1}">
-                <a14:hiddenEffects xmlns:a14="http://schemas.microsoft.com/office/drawing/2010/main" xmlns="">
+                <a14:hiddenEffects xmlns="" xmlns:a14="http://schemas.microsoft.com/office/drawing/2010/main">
                   <a:effectLst>
                     <a:outerShdw blurRad="63500" dist="38099" dir="2700000" algn="ctr" rotWithShape="0">
                       <a:schemeClr val="bg2">
@@ -30376,12 +30345,12 @@
             <a:effectLst/>
             <a:extLst>
               <a:ext uri="{909E8E84-426E-40dd-AFC4-6F175D3DCCD1}">
-                <a14:hiddenFill xmlns:a14="http://schemas.microsoft.com/office/drawing/2010/main" xmlns="">
+                <a14:hiddenFill xmlns="" xmlns:a14="http://schemas.microsoft.com/office/drawing/2010/main">
                   <a:noFill/>
                 </a14:hiddenFill>
               </a:ext>
               <a:ext uri="{AF507438-7753-43e0-B8FC-AC1667EBCBE1}">
-                <a14:hiddenEffects xmlns:a14="http://schemas.microsoft.com/office/drawing/2010/main" xmlns="">
+                <a14:hiddenEffects xmlns="" xmlns:a14="http://schemas.microsoft.com/office/drawing/2010/main">
                   <a:effectLst>
                     <a:outerShdw blurRad="63500" dist="38099" dir="2700000" algn="ctr" rotWithShape="0">
                       <a:schemeClr val="bg2">
@@ -30429,14 +30398,14 @@
             <a:effectLst/>
             <a:extLst>
               <a:ext uri="{909E8E84-426E-40dd-AFC4-6F175D3DCCD1}">
-                <a14:hiddenFill xmlns:a14="http://schemas.microsoft.com/office/drawing/2010/main" xmlns="">
+                <a14:hiddenFill xmlns="" xmlns:a14="http://schemas.microsoft.com/office/drawing/2010/main">
                   <a:solidFill>
                     <a:schemeClr val="accent1"/>
                   </a:solidFill>
                 </a14:hiddenFill>
               </a:ext>
               <a:ext uri="{91240B29-F687-4f45-9708-019B960494DF}">
-                <a14:hiddenLine xmlns:a14="http://schemas.microsoft.com/office/drawing/2010/main" xmlns="" w="9525">
+                <a14:hiddenLine xmlns="" xmlns:a14="http://schemas.microsoft.com/office/drawing/2010/main" w="9525">
                   <a:solidFill>
                     <a:schemeClr val="tx1"/>
                   </a:solidFill>
@@ -30446,7 +30415,7 @@
                 </a14:hiddenLine>
               </a:ext>
               <a:ext uri="{AF507438-7753-43e0-B8FC-AC1667EBCBE1}">
-                <a14:hiddenEffects xmlns:a14="http://schemas.microsoft.com/office/drawing/2010/main" xmlns="">
+                <a14:hiddenEffects xmlns="" xmlns:a14="http://schemas.microsoft.com/office/drawing/2010/main">
                   <a:effectLst>
                     <a:outerShdw blurRad="63500" dist="38099" dir="2700000" algn="ctr" rotWithShape="0">
                       <a:schemeClr val="bg2">
@@ -30601,14 +30570,14 @@
             <a:effectLst/>
             <a:extLst>
               <a:ext uri="{909E8E84-426E-40dd-AFC4-6F175D3DCCD1}">
-                <a14:hiddenFill xmlns:a14="http://schemas.microsoft.com/office/drawing/2010/main" xmlns="">
+                <a14:hiddenFill xmlns="" xmlns:a14="http://schemas.microsoft.com/office/drawing/2010/main">
                   <a:solidFill>
                     <a:schemeClr val="accent1"/>
                   </a:solidFill>
                 </a14:hiddenFill>
               </a:ext>
               <a:ext uri="{91240B29-F687-4f45-9708-019B960494DF}">
-                <a14:hiddenLine xmlns:a14="http://schemas.microsoft.com/office/drawing/2010/main" xmlns="" w="9525">
+                <a14:hiddenLine xmlns="" xmlns:a14="http://schemas.microsoft.com/office/drawing/2010/main" w="9525">
                   <a:solidFill>
                     <a:schemeClr val="tx1"/>
                   </a:solidFill>
@@ -30618,7 +30587,7 @@
                 </a14:hiddenLine>
               </a:ext>
               <a:ext uri="{AF507438-7753-43e0-B8FC-AC1667EBCBE1}">
-                <a14:hiddenEffects xmlns:a14="http://schemas.microsoft.com/office/drawing/2010/main" xmlns="">
+                <a14:hiddenEffects xmlns="" xmlns:a14="http://schemas.microsoft.com/office/drawing/2010/main">
                   <a:effectLst>
                     <a:outerShdw blurRad="63500" dist="38099" dir="2700000" algn="ctr" rotWithShape="0">
                       <a:schemeClr val="bg2">
@@ -30786,7 +30755,7 @@
             <a:effectLst/>
             <a:extLst>
               <a:ext uri="{AF507438-7753-43e0-B8FC-AC1667EBCBE1}">
-                <a14:hiddenEffects xmlns:a14="http://schemas.microsoft.com/office/drawing/2010/main" xmlns="">
+                <a14:hiddenEffects xmlns="" xmlns:a14="http://schemas.microsoft.com/office/drawing/2010/main">
                   <a:effectLst>
                     <a:outerShdw blurRad="63500" dist="38099" dir="2700000" algn="ctr" rotWithShape="0">
                       <a:schemeClr val="bg2">
@@ -30845,7 +30814,7 @@
             <a:effectLst/>
             <a:extLst>
               <a:ext uri="{AF507438-7753-43e0-B8FC-AC1667EBCBE1}">
-                <a14:hiddenEffects xmlns:a14="http://schemas.microsoft.com/office/drawing/2010/main" xmlns="">
+                <a14:hiddenEffects xmlns="" xmlns:a14="http://schemas.microsoft.com/office/drawing/2010/main">
                   <a:effectLst>
                     <a:outerShdw blurRad="63500" dist="38099" dir="2700000" algn="ctr" rotWithShape="0">
                       <a:schemeClr val="bg2">
@@ -30902,12 +30871,12 @@
             <a:effectLst/>
             <a:extLst>
               <a:ext uri="{909E8E84-426E-40dd-AFC4-6F175D3DCCD1}">
-                <a14:hiddenFill xmlns:a14="http://schemas.microsoft.com/office/drawing/2010/main" xmlns="">
+                <a14:hiddenFill xmlns="" xmlns:a14="http://schemas.microsoft.com/office/drawing/2010/main">
                   <a:noFill/>
                 </a14:hiddenFill>
               </a:ext>
               <a:ext uri="{AF507438-7753-43e0-B8FC-AC1667EBCBE1}">
-                <a14:hiddenEffects xmlns:a14="http://schemas.microsoft.com/office/drawing/2010/main" xmlns="">
+                <a14:hiddenEffects xmlns="" xmlns:a14="http://schemas.microsoft.com/office/drawing/2010/main">
                   <a:effectLst>
                     <a:outerShdw blurRad="63500" dist="38099" dir="2700000" algn="ctr" rotWithShape="0">
                       <a:schemeClr val="bg2">
@@ -30960,12 +30929,12 @@
             <a:effectLst/>
             <a:extLst>
               <a:ext uri="{909E8E84-426E-40dd-AFC4-6F175D3DCCD1}">
-                <a14:hiddenFill xmlns:a14="http://schemas.microsoft.com/office/drawing/2010/main" xmlns="">
+                <a14:hiddenFill xmlns="" xmlns:a14="http://schemas.microsoft.com/office/drawing/2010/main">
                   <a:noFill/>
                 </a14:hiddenFill>
               </a:ext>
               <a:ext uri="{AF507438-7753-43e0-B8FC-AC1667EBCBE1}">
-                <a14:hiddenEffects xmlns:a14="http://schemas.microsoft.com/office/drawing/2010/main" xmlns="">
+                <a14:hiddenEffects xmlns="" xmlns:a14="http://schemas.microsoft.com/office/drawing/2010/main">
                   <a:effectLst>
                     <a:outerShdw blurRad="63500" dist="38099" dir="2700000" algn="ctr" rotWithShape="0">
                       <a:schemeClr val="bg2">
@@ -31013,14 +30982,14 @@
             <a:effectLst/>
             <a:extLst>
               <a:ext uri="{909E8E84-426E-40dd-AFC4-6F175D3DCCD1}">
-                <a14:hiddenFill xmlns:a14="http://schemas.microsoft.com/office/drawing/2010/main" xmlns="">
+                <a14:hiddenFill xmlns="" xmlns:a14="http://schemas.microsoft.com/office/drawing/2010/main">
                   <a:solidFill>
                     <a:schemeClr val="accent1"/>
                   </a:solidFill>
                 </a14:hiddenFill>
               </a:ext>
               <a:ext uri="{91240B29-F687-4f45-9708-019B960494DF}">
-                <a14:hiddenLine xmlns:a14="http://schemas.microsoft.com/office/drawing/2010/main" xmlns="" w="9525">
+                <a14:hiddenLine xmlns="" xmlns:a14="http://schemas.microsoft.com/office/drawing/2010/main" w="9525">
                   <a:solidFill>
                     <a:schemeClr val="tx1"/>
                   </a:solidFill>
@@ -31030,7 +30999,7 @@
                 </a14:hiddenLine>
               </a:ext>
               <a:ext uri="{AF507438-7753-43e0-B8FC-AC1667EBCBE1}">
-                <a14:hiddenEffects xmlns:a14="http://schemas.microsoft.com/office/drawing/2010/main" xmlns="">
+                <a14:hiddenEffects xmlns="" xmlns:a14="http://schemas.microsoft.com/office/drawing/2010/main">
                   <a:effectLst>
                     <a:outerShdw blurRad="63500" dist="38099" dir="2700000" algn="ctr" rotWithShape="0">
                       <a:schemeClr val="bg2">
@@ -31185,14 +31154,14 @@
             <a:effectLst/>
             <a:extLst>
               <a:ext uri="{909E8E84-426E-40dd-AFC4-6F175D3DCCD1}">
-                <a14:hiddenFill xmlns:a14="http://schemas.microsoft.com/office/drawing/2010/main" xmlns="">
+                <a14:hiddenFill xmlns="" xmlns:a14="http://schemas.microsoft.com/office/drawing/2010/main">
                   <a:solidFill>
                     <a:schemeClr val="accent1"/>
                   </a:solidFill>
                 </a14:hiddenFill>
               </a:ext>
               <a:ext uri="{91240B29-F687-4f45-9708-019B960494DF}">
-                <a14:hiddenLine xmlns:a14="http://schemas.microsoft.com/office/drawing/2010/main" xmlns="" w="9525">
+                <a14:hiddenLine xmlns="" xmlns:a14="http://schemas.microsoft.com/office/drawing/2010/main" w="9525">
                   <a:solidFill>
                     <a:schemeClr val="tx1"/>
                   </a:solidFill>
@@ -31202,7 +31171,7 @@
                 </a14:hiddenLine>
               </a:ext>
               <a:ext uri="{AF507438-7753-43e0-B8FC-AC1667EBCBE1}">
-                <a14:hiddenEffects xmlns:a14="http://schemas.microsoft.com/office/drawing/2010/main" xmlns="">
+                <a14:hiddenEffects xmlns="" xmlns:a14="http://schemas.microsoft.com/office/drawing/2010/main">
                   <a:effectLst>
                     <a:outerShdw blurRad="63500" dist="38099" dir="2700000" algn="ctr" rotWithShape="0">
                       <a:schemeClr val="bg2">
@@ -36357,7 +36326,7 @@
           </a:ln>
           <a:extLst>
             <a:ext uri="{909E8E84-426E-40dd-AFC4-6F175D3DCCD1}">
-              <a14:hiddenFill xmlns:a14="http://schemas.microsoft.com/office/drawing/2010/main" xmlns="">
+              <a14:hiddenFill xmlns="" xmlns:a14="http://schemas.microsoft.com/office/drawing/2010/main">
                 <a:solidFill>
                   <a:srgbClr val="FFFFFF"/>
                 </a:solidFill>
@@ -36467,7 +36436,7 @@
           </a:ln>
           <a:extLst>
             <a:ext uri="{909E8E84-426E-40dd-AFC4-6F175D3DCCD1}">
-              <a14:hiddenFill xmlns:a14="http://schemas.microsoft.com/office/drawing/2010/main" xmlns="">
+              <a14:hiddenFill xmlns="" xmlns:a14="http://schemas.microsoft.com/office/drawing/2010/main">
                 <a:solidFill>
                   <a:srgbClr val="FFFFFF"/>
                 </a:solidFill>
@@ -36505,14 +36474,14 @@
           </a:ln>
           <a:extLst>
             <a:ext uri="{909E8E84-426E-40dd-AFC4-6F175D3DCCD1}">
-              <a14:hiddenFill xmlns:a14="http://schemas.microsoft.com/office/drawing/2010/main" xmlns="">
+              <a14:hiddenFill xmlns="" xmlns:a14="http://schemas.microsoft.com/office/drawing/2010/main">
                 <a:solidFill>
                   <a:srgbClr val="FFFFFF"/>
                 </a:solidFill>
               </a14:hiddenFill>
             </a:ext>
             <a:ext uri="{91240B29-F687-4f45-9708-019B960494DF}">
-              <a14:hiddenLine xmlns:a14="http://schemas.microsoft.com/office/drawing/2010/main" xmlns="" w="9525">
+              <a14:hiddenLine xmlns="" xmlns:a14="http://schemas.microsoft.com/office/drawing/2010/main" w="9525">
                 <a:solidFill>
                   <a:srgbClr val="000000"/>
                 </a:solidFill>
@@ -36668,14 +36637,14 @@
           </a:ln>
           <a:extLst>
             <a:ext uri="{909E8E84-426E-40dd-AFC4-6F175D3DCCD1}">
-              <a14:hiddenFill xmlns:a14="http://schemas.microsoft.com/office/drawing/2010/main" xmlns="">
+              <a14:hiddenFill xmlns="" xmlns:a14="http://schemas.microsoft.com/office/drawing/2010/main">
                 <a:solidFill>
                   <a:srgbClr val="FFFFFF"/>
                 </a:solidFill>
               </a14:hiddenFill>
             </a:ext>
             <a:ext uri="{91240B29-F687-4f45-9708-019B960494DF}">
-              <a14:hiddenLine xmlns:a14="http://schemas.microsoft.com/office/drawing/2010/main" xmlns="" w="9525">
+              <a14:hiddenLine xmlns="" xmlns:a14="http://schemas.microsoft.com/office/drawing/2010/main" w="9525">
                 <a:solidFill>
                   <a:srgbClr val="000000"/>
                 </a:solidFill>
@@ -36831,14 +36800,14 @@
           </a:ln>
           <a:extLst>
             <a:ext uri="{909E8E84-426E-40dd-AFC4-6F175D3DCCD1}">
-              <a14:hiddenFill xmlns:a14="http://schemas.microsoft.com/office/drawing/2010/main" xmlns="">
+              <a14:hiddenFill xmlns="" xmlns:a14="http://schemas.microsoft.com/office/drawing/2010/main">
                 <a:solidFill>
                   <a:srgbClr val="FFFFFF"/>
                 </a:solidFill>
               </a14:hiddenFill>
             </a:ext>
             <a:ext uri="{91240B29-F687-4f45-9708-019B960494DF}">
-              <a14:hiddenLine xmlns:a14="http://schemas.microsoft.com/office/drawing/2010/main" xmlns="" w="9525">
+              <a14:hiddenLine xmlns="" xmlns:a14="http://schemas.microsoft.com/office/drawing/2010/main" w="9525">
                 <a:solidFill>
                   <a:srgbClr val="000000"/>
                 </a:solidFill>
@@ -37067,7 +37036,7 @@
           </a:ln>
           <a:extLst>
             <a:ext uri="{909E8E84-426E-40dd-AFC4-6F175D3DCCD1}">
-              <a14:hiddenFill xmlns:a14="http://schemas.microsoft.com/office/drawing/2010/main" xmlns="">
+              <a14:hiddenFill xmlns="" xmlns:a14="http://schemas.microsoft.com/office/drawing/2010/main">
                 <a:solidFill>
                   <a:srgbClr val="FFFFFF"/>
                 </a:solidFill>
@@ -37110,7 +37079,7 @@
           </a:ln>
           <a:extLst>
             <a:ext uri="{909E8E84-426E-40dd-AFC4-6F175D3DCCD1}">
-              <a14:hiddenFill xmlns:a14="http://schemas.microsoft.com/office/drawing/2010/main" xmlns="">
+              <a14:hiddenFill xmlns="" xmlns:a14="http://schemas.microsoft.com/office/drawing/2010/main">
                 <a:noFill/>
               </a14:hiddenFill>
             </a:ext>
@@ -37234,7 +37203,7 @@
             </a:ln>
             <a:extLst>
               <a:ext uri="{909E8E84-426E-40dd-AFC4-6F175D3DCCD1}">
-                <a14:hiddenFill xmlns:a14="http://schemas.microsoft.com/office/drawing/2010/main" xmlns="">
+                <a14:hiddenFill xmlns="" xmlns:a14="http://schemas.microsoft.com/office/drawing/2010/main">
                   <a:solidFill>
                     <a:srgbClr val="FFFFFF"/>
                   </a:solidFill>
@@ -37413,7 +37382,7 @@
             </a:ln>
             <a:extLst>
               <a:ext uri="{909E8E84-426E-40dd-AFC4-6F175D3DCCD1}">
-                <a14:hiddenFill xmlns:a14="http://schemas.microsoft.com/office/drawing/2010/main" xmlns="">
+                <a14:hiddenFill xmlns="" xmlns:a14="http://schemas.microsoft.com/office/drawing/2010/main">
                   <a:solidFill>
                     <a:srgbClr val="FFFFFF"/>
                   </a:solidFill>
@@ -37456,7 +37425,7 @@
             </a:ln>
             <a:extLst>
               <a:ext uri="{909E8E84-426E-40dd-AFC4-6F175D3DCCD1}">
-                <a14:hiddenFill xmlns:a14="http://schemas.microsoft.com/office/drawing/2010/main" xmlns="">
+                <a14:hiddenFill xmlns="" xmlns:a14="http://schemas.microsoft.com/office/drawing/2010/main">
                   <a:noFill/>
                 </a14:hiddenFill>
               </a:ext>
@@ -37497,7 +37466,7 @@
             </a:ln>
             <a:extLst>
               <a:ext uri="{909E8E84-426E-40dd-AFC4-6F175D3DCCD1}">
-                <a14:hiddenFill xmlns:a14="http://schemas.microsoft.com/office/drawing/2010/main" xmlns="">
+                <a14:hiddenFill xmlns="" xmlns:a14="http://schemas.microsoft.com/office/drawing/2010/main">
                   <a:noFill/>
                 </a14:hiddenFill>
               </a:ext>
@@ -37555,7 +37524,7 @@
             </a:ln>
             <a:extLst>
               <a:ext uri="{909E8E84-426E-40dd-AFC4-6F175D3DCCD1}">
-                <a14:hiddenFill xmlns:a14="http://schemas.microsoft.com/office/drawing/2010/main" xmlns="">
+                <a14:hiddenFill xmlns="" xmlns:a14="http://schemas.microsoft.com/office/drawing/2010/main">
                   <a:noFill/>
                 </a14:hiddenFill>
               </a:ext>
@@ -37591,14 +37560,14 @@
             </a:ln>
             <a:extLst>
               <a:ext uri="{909E8E84-426E-40dd-AFC4-6F175D3DCCD1}">
-                <a14:hiddenFill xmlns:a14="http://schemas.microsoft.com/office/drawing/2010/main" xmlns="">
+                <a14:hiddenFill xmlns="" xmlns:a14="http://schemas.microsoft.com/office/drawing/2010/main">
                   <a:solidFill>
                     <a:srgbClr val="FFFFFF"/>
                   </a:solidFill>
                 </a14:hiddenFill>
               </a:ext>
               <a:ext uri="{91240B29-F687-4f45-9708-019B960494DF}">
-                <a14:hiddenLine xmlns:a14="http://schemas.microsoft.com/office/drawing/2010/main" xmlns="" w="38100">
+                <a14:hiddenLine xmlns="" xmlns:a14="http://schemas.microsoft.com/office/drawing/2010/main" w="38100">
                   <a:solidFill>
                     <a:srgbClr val="000000"/>
                   </a:solidFill>
@@ -37759,7 +37728,7 @@
             </a:ln>
             <a:extLst>
               <a:ext uri="{909E8E84-426E-40dd-AFC4-6F175D3DCCD1}">
-                <a14:hiddenFill xmlns:a14="http://schemas.microsoft.com/office/drawing/2010/main" xmlns="">
+                <a14:hiddenFill xmlns="" xmlns:a14="http://schemas.microsoft.com/office/drawing/2010/main">
                   <a:noFill/>
                 </a14:hiddenFill>
               </a:ext>
@@ -37812,14 +37781,14 @@
             </a:ln>
             <a:extLst>
               <a:ext uri="{909E8E84-426E-40dd-AFC4-6F175D3DCCD1}">
-                <a14:hiddenFill xmlns:a14="http://schemas.microsoft.com/office/drawing/2010/main" xmlns="">
+                <a14:hiddenFill xmlns="" xmlns:a14="http://schemas.microsoft.com/office/drawing/2010/main">
                   <a:solidFill>
                     <a:srgbClr val="FFFFFF"/>
                   </a:solidFill>
                 </a14:hiddenFill>
               </a:ext>
               <a:ext uri="{91240B29-F687-4f45-9708-019B960494DF}">
-                <a14:hiddenLine xmlns:a14="http://schemas.microsoft.com/office/drawing/2010/main" xmlns="" w="38100">
+                <a14:hiddenLine xmlns="" xmlns:a14="http://schemas.microsoft.com/office/drawing/2010/main" w="38100">
                   <a:solidFill>
                     <a:srgbClr val="000000"/>
                   </a:solidFill>
@@ -37982,7 +37951,7 @@
             </a:ln>
             <a:extLst>
               <a:ext uri="{909E8E84-426E-40dd-AFC4-6F175D3DCCD1}">
-                <a14:hiddenFill xmlns:a14="http://schemas.microsoft.com/office/drawing/2010/main" xmlns="">
+                <a14:hiddenFill xmlns="" xmlns:a14="http://schemas.microsoft.com/office/drawing/2010/main">
                   <a:noFill/>
                 </a14:hiddenFill>
               </a:ext>
@@ -38018,7 +37987,7 @@
             </a:ln>
             <a:extLst>
               <a:ext uri="{909E8E84-426E-40dd-AFC4-6F175D3DCCD1}">
-                <a14:hiddenFill xmlns:a14="http://schemas.microsoft.com/office/drawing/2010/main" xmlns="">
+                <a14:hiddenFill xmlns="" xmlns:a14="http://schemas.microsoft.com/office/drawing/2010/main">
                   <a:noFill/>
                 </a14:hiddenFill>
               </a:ext>
@@ -38069,7 +38038,7 @@
             </a:ln>
             <a:extLst>
               <a:ext uri="{909E8E84-426E-40dd-AFC4-6F175D3DCCD1}">
-                <a14:hiddenFill xmlns:a14="http://schemas.microsoft.com/office/drawing/2010/main" xmlns="">
+                <a14:hiddenFill xmlns="" xmlns:a14="http://schemas.microsoft.com/office/drawing/2010/main">
                   <a:noFill/>
                 </a14:hiddenFill>
               </a:ext>
@@ -38105,14 +38074,14 @@
             </a:ln>
             <a:extLst>
               <a:ext uri="{909E8E84-426E-40dd-AFC4-6F175D3DCCD1}">
-                <a14:hiddenFill xmlns:a14="http://schemas.microsoft.com/office/drawing/2010/main" xmlns="">
+                <a14:hiddenFill xmlns="" xmlns:a14="http://schemas.microsoft.com/office/drawing/2010/main">
                   <a:solidFill>
                     <a:srgbClr val="FFFFFF"/>
                   </a:solidFill>
                 </a14:hiddenFill>
               </a:ext>
               <a:ext uri="{91240B29-F687-4f45-9708-019B960494DF}">
-                <a14:hiddenLine xmlns:a14="http://schemas.microsoft.com/office/drawing/2010/main" xmlns="" w="38100">
+                <a14:hiddenLine xmlns="" xmlns:a14="http://schemas.microsoft.com/office/drawing/2010/main" w="38100">
                   <a:solidFill>
                     <a:srgbClr val="000000"/>
                   </a:solidFill>

</xml_diff>